<commit_message>
Update 19360859053_HumeyraCimen_Bitirme Çalışması - Sunum.pptx
</commit_message>
<xml_diff>
--- a/19360859053_HumeyraCimen_Bitirme Çalışması - Sunum.pptx
+++ b/19360859053_HumeyraCimen_Bitirme Çalışması - Sunum.pptx
@@ -208,7 +208,7 @@
           <a:p>
             <a:fld id="{B7B6C851-AF85-4351-9E46-7B0385E9AF74}" type="datetimeFigureOut">
               <a:rPr lang="tr-TR" smtClean="0"/>
-              <a:t>31.05.2024</a:t>
+              <a:t>9.06.2024</a:t>
             </a:fld>
             <a:endParaRPr lang="tr-TR"/>
           </a:p>
@@ -3662,7 +3662,7 @@
           <a:p>
             <a:r>
               <a:rPr lang="tr-TR" sz="4000" dirty="0"/>
-              <a:t>Bitirme Çalışması  Sonuç</a:t>
+              <a:t>Kaynakça</a:t>
             </a:r>
           </a:p>
         </p:txBody>
@@ -3685,33 +3685,285 @@
         </p:spPr>
         <p:txBody>
           <a:bodyPr anchor="ctr">
-            <a:normAutofit fontScale="92500" lnSpcReduction="20000"/>
+            <a:normAutofit fontScale="92500"/>
           </a:bodyPr>
           <a:lstStyle/>
           <a:p>
             <a:r>
-              <a:rPr lang="tr-TR" sz="2400" dirty="0"/>
-              <a:t>Bitirme çalışması sunumunda karşılaşılan güçlüklere </a:t>
-            </a:r>
-            <a:r>
-              <a:rPr lang="tr-TR" sz="2400" dirty="0" err="1"/>
-              <a:t>ilişlkin</a:t>
-            </a:r>
-            <a:r>
-              <a:rPr lang="tr-TR" sz="2400" dirty="0"/>
-              <a:t> son yorumların yer aldığı, yapılan çalışma, geliştirilen yöntem ve yazılıma ilişkin yorumları barındıran sonuç kısmı yer alır. </a:t>
-            </a:r>
-          </a:p>
-          <a:p>
-            <a:r>
-              <a:rPr lang="tr-TR" sz="2400" dirty="0"/>
-              <a:t>Bitirme çalışmasında yöntemin çözemediği durumlar, yada yazılımın eksik yanları sonuç kısmında tartışılmalıdır.</a:t>
-            </a:r>
-          </a:p>
-          <a:p>
-            <a:r>
-              <a:rPr lang="tr-TR" sz="2400" dirty="0"/>
-              <a:t>Örneğin konu mobil harita uygulaması için bu uygulamanın sürekli internete bağlı çalışması gerektiği bir eksiklik ise bundan bahsedilmelidir.</a:t>
+              <a:rPr lang="tr-TR" sz="2400" dirty="0">
+                <a:effectLst/>
+                <a:latin typeface="Times New Roman" panose="02020603050405020304" pitchFamily="18" charset="0"/>
+                <a:ea typeface="Times New Roman" panose="02020603050405020304" pitchFamily="18" charset="0"/>
+              </a:rPr>
+              <a:t> EU-</a:t>
+            </a:r>
+            <a:r>
+              <a:rPr lang="tr-TR" sz="2400" dirty="0" err="1">
+                <a:effectLst/>
+                <a:latin typeface="Times New Roman" panose="02020603050405020304" pitchFamily="18" charset="0"/>
+                <a:ea typeface="Times New Roman" panose="02020603050405020304" pitchFamily="18" charset="0"/>
+              </a:rPr>
+              <a:t>Startups</a:t>
+            </a:r>
+            <a:r>
+              <a:rPr lang="tr-TR" sz="2400" dirty="0">
+                <a:effectLst/>
+                <a:latin typeface="Times New Roman" panose="02020603050405020304" pitchFamily="18" charset="0"/>
+                <a:ea typeface="Times New Roman" panose="02020603050405020304" pitchFamily="18" charset="0"/>
+              </a:rPr>
+              <a:t>. "EU-</a:t>
+            </a:r>
+            <a:r>
+              <a:rPr lang="tr-TR" sz="2400" dirty="0" err="1">
+                <a:effectLst/>
+                <a:latin typeface="Times New Roman" panose="02020603050405020304" pitchFamily="18" charset="0"/>
+                <a:ea typeface="Times New Roman" panose="02020603050405020304" pitchFamily="18" charset="0"/>
+              </a:rPr>
+              <a:t>Startups</a:t>
+            </a:r>
+            <a:r>
+              <a:rPr lang="tr-TR" sz="2400" dirty="0">
+                <a:effectLst/>
+                <a:latin typeface="Times New Roman" panose="02020603050405020304" pitchFamily="18" charset="0"/>
+                <a:ea typeface="Times New Roman" panose="02020603050405020304" pitchFamily="18" charset="0"/>
+              </a:rPr>
+              <a:t> Directory". Erişim Tarihi: 30 Mayıs 2024. URL: https://www.eu-startups.com/directory/</a:t>
+            </a:r>
+          </a:p>
+          <a:p>
+            <a:r>
+              <a:rPr lang="tr-TR" sz="2400" dirty="0">
+                <a:effectLst/>
+                <a:latin typeface="Times New Roman" panose="02020603050405020304" pitchFamily="18" charset="0"/>
+                <a:ea typeface="Times New Roman" panose="02020603050405020304" pitchFamily="18" charset="0"/>
+              </a:rPr>
+              <a:t> </a:t>
+            </a:r>
+            <a:r>
+              <a:rPr lang="tr-TR" sz="2400" dirty="0" err="1">
+                <a:effectLst/>
+                <a:latin typeface="Times New Roman" panose="02020603050405020304" pitchFamily="18" charset="0"/>
+                <a:ea typeface="Times New Roman" panose="02020603050405020304" pitchFamily="18" charset="0"/>
+              </a:rPr>
+              <a:t>OpenAI</a:t>
+            </a:r>
+            <a:r>
+              <a:rPr lang="tr-TR" sz="2400" dirty="0">
+                <a:effectLst/>
+                <a:latin typeface="Times New Roman" panose="02020603050405020304" pitchFamily="18" charset="0"/>
+                <a:ea typeface="Times New Roman" panose="02020603050405020304" pitchFamily="18" charset="0"/>
+              </a:rPr>
+              <a:t>. "GPT-3.5: Language </a:t>
+            </a:r>
+            <a:r>
+              <a:rPr lang="tr-TR" sz="2400" dirty="0" err="1">
+                <a:effectLst/>
+                <a:latin typeface="Times New Roman" panose="02020603050405020304" pitchFamily="18" charset="0"/>
+                <a:ea typeface="Times New Roman" panose="02020603050405020304" pitchFamily="18" charset="0"/>
+              </a:rPr>
+              <a:t>Models</a:t>
+            </a:r>
+            <a:r>
+              <a:rPr lang="tr-TR" sz="2400" dirty="0">
+                <a:effectLst/>
+                <a:latin typeface="Times New Roman" panose="02020603050405020304" pitchFamily="18" charset="0"/>
+                <a:ea typeface="Times New Roman" panose="02020603050405020304" pitchFamily="18" charset="0"/>
+              </a:rPr>
+              <a:t> </a:t>
+            </a:r>
+            <a:r>
+              <a:rPr lang="tr-TR" sz="2400" dirty="0" err="1">
+                <a:effectLst/>
+                <a:latin typeface="Times New Roman" panose="02020603050405020304" pitchFamily="18" charset="0"/>
+                <a:ea typeface="Times New Roman" panose="02020603050405020304" pitchFamily="18" charset="0"/>
+              </a:rPr>
+              <a:t>Are</a:t>
+            </a:r>
+            <a:r>
+              <a:rPr lang="tr-TR" sz="2400" dirty="0">
+                <a:effectLst/>
+                <a:latin typeface="Times New Roman" panose="02020603050405020304" pitchFamily="18" charset="0"/>
+                <a:ea typeface="Times New Roman" panose="02020603050405020304" pitchFamily="18" charset="0"/>
+              </a:rPr>
+              <a:t> </a:t>
+            </a:r>
+            <a:r>
+              <a:rPr lang="tr-TR" sz="2400" dirty="0" err="1">
+                <a:effectLst/>
+                <a:latin typeface="Times New Roman" panose="02020603050405020304" pitchFamily="18" charset="0"/>
+                <a:ea typeface="Times New Roman" panose="02020603050405020304" pitchFamily="18" charset="0"/>
+              </a:rPr>
+              <a:t>Few-Shot</a:t>
+            </a:r>
+            <a:r>
+              <a:rPr lang="tr-TR" sz="2400" dirty="0">
+                <a:effectLst/>
+                <a:latin typeface="Times New Roman" panose="02020603050405020304" pitchFamily="18" charset="0"/>
+                <a:ea typeface="Times New Roman" panose="02020603050405020304" pitchFamily="18" charset="0"/>
+              </a:rPr>
+              <a:t> </a:t>
+            </a:r>
+            <a:r>
+              <a:rPr lang="tr-TR" sz="2400" dirty="0" err="1">
+                <a:effectLst/>
+                <a:latin typeface="Times New Roman" panose="02020603050405020304" pitchFamily="18" charset="0"/>
+                <a:ea typeface="Times New Roman" panose="02020603050405020304" pitchFamily="18" charset="0"/>
+              </a:rPr>
+              <a:t>Learners</a:t>
+            </a:r>
+            <a:r>
+              <a:rPr lang="tr-TR" sz="2400" dirty="0">
+                <a:effectLst/>
+                <a:latin typeface="Times New Roman" panose="02020603050405020304" pitchFamily="18" charset="0"/>
+                <a:ea typeface="Times New Roman" panose="02020603050405020304" pitchFamily="18" charset="0"/>
+              </a:rPr>
+              <a:t>." https://openai.com/blog/language- </a:t>
+            </a:r>
+            <a:r>
+              <a:rPr lang="tr-TR" sz="2400" dirty="0" err="1">
+                <a:effectLst/>
+                <a:latin typeface="Times New Roman" panose="02020603050405020304" pitchFamily="18" charset="0"/>
+                <a:ea typeface="Times New Roman" panose="02020603050405020304" pitchFamily="18" charset="0"/>
+              </a:rPr>
+              <a:t>models</a:t>
+            </a:r>
+            <a:r>
+              <a:rPr lang="tr-TR" sz="2400" dirty="0">
+                <a:effectLst/>
+                <a:latin typeface="Times New Roman" panose="02020603050405020304" pitchFamily="18" charset="0"/>
+                <a:ea typeface="Times New Roman" panose="02020603050405020304" pitchFamily="18" charset="0"/>
+              </a:rPr>
+              <a:t>/.</a:t>
+            </a:r>
+          </a:p>
+          <a:p>
+            <a:r>
+              <a:rPr lang="tr-TR" sz="2400" dirty="0" err="1">
+                <a:effectLst/>
+                <a:latin typeface="Times New Roman" panose="02020603050405020304" pitchFamily="18" charset="0"/>
+                <a:ea typeface="Times New Roman" panose="02020603050405020304" pitchFamily="18" charset="0"/>
+              </a:rPr>
+              <a:t>Devlin</a:t>
+            </a:r>
+            <a:r>
+              <a:rPr lang="tr-TR" sz="2400" dirty="0">
+                <a:effectLst/>
+                <a:latin typeface="Times New Roman" panose="02020603050405020304" pitchFamily="18" charset="0"/>
+                <a:ea typeface="Times New Roman" panose="02020603050405020304" pitchFamily="18" charset="0"/>
+              </a:rPr>
+              <a:t>, J., Chang, M.-W., Lee, K., &amp; </a:t>
+            </a:r>
+            <a:r>
+              <a:rPr lang="tr-TR" sz="2400" dirty="0" err="1">
+                <a:effectLst/>
+                <a:latin typeface="Times New Roman" panose="02020603050405020304" pitchFamily="18" charset="0"/>
+                <a:ea typeface="Times New Roman" panose="02020603050405020304" pitchFamily="18" charset="0"/>
+              </a:rPr>
+              <a:t>Toutanova</a:t>
+            </a:r>
+            <a:r>
+              <a:rPr lang="tr-TR" sz="2400" dirty="0">
+                <a:effectLst/>
+                <a:latin typeface="Times New Roman" panose="02020603050405020304" pitchFamily="18" charset="0"/>
+                <a:ea typeface="Times New Roman" panose="02020603050405020304" pitchFamily="18" charset="0"/>
+              </a:rPr>
+              <a:t>, K. (2019). BERT: </a:t>
+            </a:r>
+            <a:r>
+              <a:rPr lang="tr-TR" sz="2400" dirty="0" err="1">
+                <a:effectLst/>
+                <a:latin typeface="Times New Roman" panose="02020603050405020304" pitchFamily="18" charset="0"/>
+                <a:ea typeface="Times New Roman" panose="02020603050405020304" pitchFamily="18" charset="0"/>
+              </a:rPr>
+              <a:t>Pre-training</a:t>
+            </a:r>
+            <a:r>
+              <a:rPr lang="tr-TR" sz="2400" dirty="0">
+                <a:effectLst/>
+                <a:latin typeface="Times New Roman" panose="02020603050405020304" pitchFamily="18" charset="0"/>
+                <a:ea typeface="Times New Roman" panose="02020603050405020304" pitchFamily="18" charset="0"/>
+              </a:rPr>
+              <a:t> of </a:t>
+            </a:r>
+            <a:r>
+              <a:rPr lang="tr-TR" sz="2400" dirty="0" err="1">
+                <a:effectLst/>
+                <a:latin typeface="Times New Roman" panose="02020603050405020304" pitchFamily="18" charset="0"/>
+                <a:ea typeface="Times New Roman" panose="02020603050405020304" pitchFamily="18" charset="0"/>
+              </a:rPr>
+              <a:t>Deep</a:t>
+            </a:r>
+            <a:r>
+              <a:rPr lang="tr-TR" sz="2400" dirty="0">
+                <a:effectLst/>
+                <a:latin typeface="Times New Roman" panose="02020603050405020304" pitchFamily="18" charset="0"/>
+                <a:ea typeface="Times New Roman" panose="02020603050405020304" pitchFamily="18" charset="0"/>
+              </a:rPr>
+              <a:t> </a:t>
+            </a:r>
+            <a:r>
+              <a:rPr lang="tr-TR" sz="2400" dirty="0" err="1">
+                <a:effectLst/>
+                <a:latin typeface="Times New Roman" panose="02020603050405020304" pitchFamily="18" charset="0"/>
+                <a:ea typeface="Times New Roman" panose="02020603050405020304" pitchFamily="18" charset="0"/>
+              </a:rPr>
+              <a:t>Bidirectional</a:t>
+            </a:r>
+            <a:r>
+              <a:rPr lang="tr-TR" sz="2400" dirty="0">
+                <a:effectLst/>
+                <a:latin typeface="Times New Roman" panose="02020603050405020304" pitchFamily="18" charset="0"/>
+                <a:ea typeface="Times New Roman" panose="02020603050405020304" pitchFamily="18" charset="0"/>
+              </a:rPr>
+              <a:t> </a:t>
+            </a:r>
+            <a:r>
+              <a:rPr lang="tr-TR" sz="2400" dirty="0" err="1">
+                <a:effectLst/>
+                <a:latin typeface="Times New Roman" panose="02020603050405020304" pitchFamily="18" charset="0"/>
+                <a:ea typeface="Times New Roman" panose="02020603050405020304" pitchFamily="18" charset="0"/>
+              </a:rPr>
+              <a:t>Transformers</a:t>
+            </a:r>
+            <a:r>
+              <a:rPr lang="tr-TR" sz="2400" dirty="0">
+                <a:effectLst/>
+                <a:latin typeface="Times New Roman" panose="02020603050405020304" pitchFamily="18" charset="0"/>
+                <a:ea typeface="Times New Roman" panose="02020603050405020304" pitchFamily="18" charset="0"/>
+              </a:rPr>
+              <a:t> </a:t>
+            </a:r>
+            <a:r>
+              <a:rPr lang="tr-TR" sz="2400" dirty="0" err="1">
+                <a:effectLst/>
+                <a:latin typeface="Times New Roman" panose="02020603050405020304" pitchFamily="18" charset="0"/>
+                <a:ea typeface="Times New Roman" panose="02020603050405020304" pitchFamily="18" charset="0"/>
+              </a:rPr>
+              <a:t>for</a:t>
+            </a:r>
+            <a:r>
+              <a:rPr lang="tr-TR" sz="2400" dirty="0">
+                <a:effectLst/>
+                <a:latin typeface="Times New Roman" panose="02020603050405020304" pitchFamily="18" charset="0"/>
+                <a:ea typeface="Times New Roman" panose="02020603050405020304" pitchFamily="18" charset="0"/>
+              </a:rPr>
+              <a:t> Language </a:t>
+            </a:r>
+            <a:r>
+              <a:rPr lang="tr-TR" sz="2400" dirty="0" err="1">
+                <a:effectLst/>
+                <a:latin typeface="Times New Roman" panose="02020603050405020304" pitchFamily="18" charset="0"/>
+                <a:ea typeface="Times New Roman" panose="02020603050405020304" pitchFamily="18" charset="0"/>
+              </a:rPr>
+              <a:t>Understanding</a:t>
+            </a:r>
+            <a:r>
+              <a:rPr lang="tr-TR" sz="2400" dirty="0">
+                <a:effectLst/>
+                <a:latin typeface="Times New Roman" panose="02020603050405020304" pitchFamily="18" charset="0"/>
+                <a:ea typeface="Times New Roman" panose="02020603050405020304" pitchFamily="18" charset="0"/>
+              </a:rPr>
+              <a:t>. arXiv:1810.04805.</a:t>
             </a:r>
           </a:p>
         </p:txBody>
@@ -5243,7 +5495,7 @@
         </p:blipFill>
         <p:spPr>
           <a:xfrm>
-            <a:off x="6863996" y="3154859"/>
+            <a:off x="6896654" y="3154859"/>
             <a:ext cx="4030579" cy="3703141"/>
           </a:xfrm>
           <a:custGeom>
@@ -12154,7 +12406,7 @@
           <p:nvPr>
             <p:extLst>
               <p:ext uri="{D42A27DB-BD31-4B8C-83A1-F6EECF244321}">
-                <p14:modId xmlns:p14="http://schemas.microsoft.com/office/powerpoint/2010/main" val="2984595066"/>
+                <p14:modId xmlns:p14="http://schemas.microsoft.com/office/powerpoint/2010/main" val="1672334746"/>
               </p:ext>
             </p:extLst>
           </p:nvPr>
@@ -12292,12 +12544,12 @@
                     <a:p>
                       <a:pPr algn="ctr"/>
                       <a:r>
-                        <a:rPr lang="tr-TR" sz="1200">
+                        <a:rPr lang="tr-TR" sz="1200" dirty="0" err="1">
                           <a:effectLst/>
                         </a:rPr>
                         <a:t>PlayerGo</a:t>
                       </a:r>
-                      <a:endParaRPr lang="tr-TR" sz="1200">
+                      <a:endParaRPr lang="tr-TR" sz="1200" dirty="0">
                         <a:effectLst/>
                         <a:latin typeface="Times New Roman" panose="02020603050405020304" pitchFamily="18" charset="0"/>
                         <a:ea typeface="Times New Roman" panose="02020603050405020304" pitchFamily="18" charset="0"/>

</xml_diff>